<commit_message>
oct 8, 17 28. modified compression slide
</commit_message>
<xml_diff>
--- a/Web Optimization.pptx
+++ b/Web Optimization.pptx
@@ -5,7 +5,7 @@
     <p:sldMasterId id="2147483648" r:id="rId1"/>
   </p:sldMasterIdLst>
   <p:notesMasterIdLst>
-    <p:notesMasterId r:id="rId22"/>
+    <p:notesMasterId r:id="rId23"/>
   </p:notesMasterIdLst>
   <p:sldIdLst>
     <p:sldId id="256" r:id="rId2"/>
@@ -20,14 +20,15 @@
     <p:sldId id="263" r:id="rId11"/>
     <p:sldId id="264" r:id="rId12"/>
     <p:sldId id="265" r:id="rId13"/>
-    <p:sldId id="266" r:id="rId14"/>
-    <p:sldId id="267" r:id="rId15"/>
-    <p:sldId id="269" r:id="rId16"/>
-    <p:sldId id="268" r:id="rId17"/>
-    <p:sldId id="271" r:id="rId18"/>
-    <p:sldId id="270" r:id="rId19"/>
-    <p:sldId id="274" r:id="rId20"/>
-    <p:sldId id="275" r:id="rId21"/>
+    <p:sldId id="276" r:id="rId14"/>
+    <p:sldId id="266" r:id="rId15"/>
+    <p:sldId id="267" r:id="rId16"/>
+    <p:sldId id="269" r:id="rId17"/>
+    <p:sldId id="268" r:id="rId18"/>
+    <p:sldId id="271" r:id="rId19"/>
+    <p:sldId id="270" r:id="rId20"/>
+    <p:sldId id="274" r:id="rId21"/>
+    <p:sldId id="275" r:id="rId22"/>
   </p:sldIdLst>
   <p:sldSz cx="12192000" cy="6858000"/>
   <p:notesSz cx="6858000" cy="9144000"/>
@@ -4033,7 +4034,12 @@
             <p:ph idx="1"/>
           </p:nvPr>
         </p:nvSpPr>
-        <p:spPr/>
+        <p:spPr>
+          <a:xfrm>
+            <a:off x="838200" y="1466193"/>
+            <a:ext cx="10515600" cy="4710770"/>
+          </a:xfrm>
+        </p:spPr>
         <p:txBody>
           <a:bodyPr>
             <a:normAutofit lnSpcReduction="10000"/>
@@ -4056,21 +4062,84 @@
               <a:t> install </a:t>
             </a:r>
             <a:r>
+              <a:rPr lang="en-US" sz="2800" dirty="0" err="1" smtClean="0">
+                <a:solidFill>
+                  <a:srgbClr val="FF0000"/>
+                </a:solidFill>
+              </a:rPr>
+              <a:t>minifier</a:t>
+            </a:r>
+            <a:r>
+              <a:rPr lang="en-US" sz="2800" dirty="0" smtClean="0">
+                <a:solidFill>
+                  <a:srgbClr val="FF0000"/>
+                </a:solidFill>
+              </a:rPr>
+              <a:t> </a:t>
+            </a:r>
+            <a:r>
+              <a:rPr lang="en-US" sz="2800" dirty="0" smtClean="0"/>
+              <a:t>–g 		# for </a:t>
+            </a:r>
+            <a:r>
               <a:rPr lang="en-US" sz="2800" dirty="0" err="1" smtClean="0"/>
-              <a:t>minifier</a:t>
+              <a:t>js</a:t>
             </a:r>
             <a:r>
               <a:rPr lang="en-US" sz="2800" dirty="0" smtClean="0"/>
-              <a:t> html-minify -g</a:t>
-            </a:r>
+              <a:t> and </a:t>
+            </a:r>
+            <a:r>
+              <a:rPr lang="en-US" sz="2800" dirty="0" err="1" smtClean="0"/>
+              <a:t>css</a:t>
+            </a:r>
+            <a:r>
+              <a:rPr lang="en-US" sz="2800" dirty="0" smtClean="0"/>
+              <a:t> filed</a:t>
+            </a:r>
+            <a:endParaRPr lang="en-US" sz="2800" dirty="0" smtClean="0"/>
           </a:p>
           <a:p>
             <a:pPr marL="0" indent="0">
               <a:buNone/>
             </a:pPr>
             <a:r>
-              <a:rPr lang="en-US" dirty="0" smtClean="0"/>
-              <a:t>&gt; cd </a:t>
+              <a:rPr lang="en-US" dirty="0"/>
+              <a:t>&gt; </a:t>
+            </a:r>
+            <a:r>
+              <a:rPr lang="en-US" dirty="0" err="1"/>
+              <a:t>npm</a:t>
+            </a:r>
+            <a:r>
+              <a:rPr lang="en-US" dirty="0"/>
+              <a:t> install </a:t>
+            </a:r>
+            <a:r>
+              <a:rPr lang="en-US" dirty="0" smtClean="0">
+                <a:solidFill>
+                  <a:srgbClr val="FF0000"/>
+                </a:solidFill>
+              </a:rPr>
+              <a:t>html-minify</a:t>
+            </a:r>
+            <a:r>
+              <a:rPr lang="en-US" dirty="0" smtClean="0"/>
+              <a:t> –g	# for html files</a:t>
+            </a:r>
+            <a:endParaRPr lang="en-US" dirty="0"/>
+          </a:p>
+          <a:p>
+            <a:pPr marL="0" indent="0">
+              <a:buNone/>
+            </a:pPr>
+            <a:r>
+              <a:rPr lang="en-US" dirty="0" smtClean="0"/>
+              <a:t>&gt; </a:t>
+            </a:r>
+            <a:r>
+              <a:rPr lang="en-US" dirty="0" smtClean="0"/>
+              <a:t>cd </a:t>
             </a:r>
             <a:r>
               <a:rPr lang="en-US" dirty="0" err="1" smtClean="0"/>
@@ -4514,8 +4583,12 @@
           <a:lstStyle/>
           <a:p>
             <a:r>
-              <a:rPr lang="en-US" dirty="0" smtClean="0"/>
-              <a:t>Other Servers</a:t>
+              <a:rPr lang="en-US" dirty="0" err="1" smtClean="0"/>
+              <a:t>http.js</a:t>
+            </a:r>
+            <a:r>
+              <a:rPr lang="en-US" dirty="0" smtClean="0"/>
+              <a:t> changes</a:t>
             </a:r>
             <a:endParaRPr lang="en-US" dirty="0"/>
           </a:p>
@@ -4533,133 +4606,206 @@
         </p:nvSpPr>
         <p:spPr/>
         <p:txBody>
-          <a:bodyPr/>
-          <a:lstStyle/>
-          <a:p>
-            <a:r>
-              <a:rPr lang="en-US" dirty="0" smtClean="0"/>
-              <a:t>For Apache, edit </a:t>
-            </a:r>
-            <a:r>
-              <a:rPr lang="en-US" dirty="0" err="1" smtClean="0"/>
-              <a:t>httpd.conf</a:t>
-            </a:r>
-            <a:endParaRPr lang="en-US" dirty="0" smtClean="0"/>
-          </a:p>
+          <a:bodyPr>
+            <a:normAutofit/>
+          </a:bodyPr>
+          <a:lstStyle/>
           <a:p>
             <a:pPr marL="0" indent="0">
               <a:buNone/>
             </a:pPr>
             <a:r>
-              <a:rPr lang="en-US" dirty="0" smtClean="0"/>
-              <a:t>&lt;</a:t>
-            </a:r>
-            <a:r>
               <a:rPr lang="en-US" dirty="0" err="1"/>
-              <a:t>IfModule</a:t>
+              <a:t>var</a:t>
+            </a:r>
+            <a:r>
+              <a:rPr lang="en-US" dirty="0"/>
+              <a:t> express = require("express");</a:t>
+            </a:r>
+          </a:p>
+          <a:p>
+            <a:pPr marL="0" indent="0">
+              <a:buNone/>
+            </a:pPr>
+            <a:r>
+              <a:rPr lang="en-US" b="1" dirty="0" err="1"/>
+              <a:t>var</a:t>
+            </a:r>
+            <a:r>
+              <a:rPr lang="en-US" b="1" dirty="0"/>
+              <a:t> compression = require("compression"); </a:t>
+            </a:r>
+            <a:r>
+              <a:rPr lang="en-US" dirty="0" smtClean="0">
+                <a:solidFill>
+                  <a:srgbClr val="FF0000"/>
+                </a:solidFill>
+              </a:rPr>
+              <a:t>//imports module</a:t>
+            </a:r>
+            <a:endParaRPr lang="en-US" dirty="0">
+              <a:solidFill>
+                <a:srgbClr val="FF0000"/>
+              </a:solidFill>
+            </a:endParaRPr>
+          </a:p>
+          <a:p>
+            <a:pPr marL="0" indent="0">
+              <a:buNone/>
+            </a:pPr>
+            <a:r>
+              <a:rPr lang="en-US" dirty="0" err="1"/>
+              <a:t>var</a:t>
+            </a:r>
+            <a:r>
+              <a:rPr lang="en-US" dirty="0"/>
+              <a:t> app = express();</a:t>
+            </a:r>
+          </a:p>
+          <a:p>
+            <a:pPr marL="0" indent="0">
+              <a:buNone/>
+            </a:pPr>
+            <a:r>
+              <a:rPr lang="en-US" dirty="0"/>
+              <a:t> </a:t>
+            </a:r>
+          </a:p>
+          <a:p>
+            <a:pPr marL="0" indent="0">
+              <a:buNone/>
+            </a:pPr>
+            <a:r>
+              <a:rPr lang="en-US" dirty="0"/>
+              <a:t>// Run static server</a:t>
+            </a:r>
+          </a:p>
+          <a:p>
+            <a:pPr marL="0" indent="0">
+              <a:buNone/>
+            </a:pPr>
+            <a:r>
+              <a:rPr lang="en-US" b="1" dirty="0" err="1"/>
+              <a:t>app.use</a:t>
+            </a:r>
+            <a:r>
+              <a:rPr lang="en-US" b="1" dirty="0"/>
+              <a:t>(compression()); </a:t>
+            </a:r>
+            <a:r>
+              <a:rPr lang="en-US" dirty="0" smtClean="0">
+                <a:solidFill>
+                  <a:srgbClr val="FF0000"/>
+                </a:solidFill>
+              </a:rPr>
+              <a:t>//</a:t>
+            </a:r>
+            <a:r>
+              <a:rPr lang="en-US" dirty="0">
+                <a:solidFill>
+                  <a:srgbClr val="FF0000"/>
+                </a:solidFill>
+              </a:rPr>
+              <a:t>hooks </a:t>
+            </a:r>
+            <a:r>
+              <a:rPr lang="en-US" dirty="0" smtClean="0">
+                <a:solidFill>
+                  <a:srgbClr val="FF0000"/>
+                </a:solidFill>
+              </a:rPr>
+              <a:t>compression </a:t>
+            </a:r>
+            <a:r>
+              <a:rPr lang="en-US" dirty="0">
+                <a:solidFill>
+                  <a:srgbClr val="FF0000"/>
+                </a:solidFill>
+              </a:rPr>
+              <a:t>module </a:t>
+            </a:r>
+            <a:r>
+              <a:rPr lang="en-US" dirty="0" smtClean="0">
+                <a:solidFill>
+                  <a:srgbClr val="FF0000"/>
+                </a:solidFill>
+              </a:rPr>
+              <a:t>to web </a:t>
+            </a:r>
+            <a:r>
+              <a:rPr lang="en-US" dirty="0">
+                <a:solidFill>
+                  <a:srgbClr val="FF0000"/>
+                </a:solidFill>
+              </a:rPr>
+              <a:t>server</a:t>
+            </a:r>
+            <a:r>
+              <a:rPr lang="en-US" dirty="0">
+                <a:solidFill>
+                  <a:srgbClr val="FF0000"/>
+                </a:solidFill>
+              </a:rPr>
+              <a:t> </a:t>
+            </a:r>
+            <a:endParaRPr lang="en-US" dirty="0">
+              <a:solidFill>
+                <a:srgbClr val="FF0000"/>
+              </a:solidFill>
+            </a:endParaRPr>
+          </a:p>
+          <a:p>
+            <a:pPr marL="0" indent="0">
+              <a:buNone/>
+            </a:pPr>
+            <a:r>
+              <a:rPr lang="en-US" dirty="0" err="1"/>
+              <a:t>app.use</a:t>
+            </a:r>
+            <a:r>
+              <a:rPr lang="en-US" dirty="0"/>
+              <a:t>(</a:t>
+            </a:r>
+            <a:r>
+              <a:rPr lang="en-US" dirty="0" err="1"/>
+              <a:t>express.static</a:t>
+            </a:r>
+            <a:r>
+              <a:rPr lang="en-US" dirty="0"/>
+              <a:t>(__</a:t>
+            </a:r>
+            <a:r>
+              <a:rPr lang="en-US" dirty="0" err="1"/>
+              <a:t>dirname</a:t>
+            </a:r>
+            <a:r>
+              <a:rPr lang="en-US" dirty="0"/>
+              <a:t>));</a:t>
+            </a:r>
+          </a:p>
+          <a:p>
+            <a:pPr marL="0" indent="0">
+              <a:buNone/>
+            </a:pPr>
+            <a:r>
+              <a:rPr lang="en-US" dirty="0" err="1"/>
+              <a:t>app.listen</a:t>
+            </a:r>
+            <a:r>
+              <a:rPr lang="en-US" dirty="0"/>
+              <a:t>(8080);</a:t>
             </a:r>
             <a:r>
               <a:rPr lang="en-US" dirty="0"/>
               <a:t> </a:t>
             </a:r>
-            <a:r>
-              <a:rPr lang="en-US" dirty="0" err="1"/>
-              <a:t>mod_deflate.c</a:t>
-            </a:r>
-            <a:r>
-              <a:rPr lang="en-US" dirty="0"/>
-              <a:t>&gt; </a:t>
-            </a:r>
-            <a:endParaRPr lang="en-US" dirty="0" smtClean="0"/>
-          </a:p>
-          <a:p>
-            <a:pPr marL="0" indent="0">
-              <a:buNone/>
-            </a:pPr>
-            <a:r>
-              <a:rPr lang="en-US" dirty="0" smtClean="0"/>
-              <a:t>    </a:t>
-            </a:r>
-            <a:r>
-              <a:rPr lang="en-US" dirty="0" err="1" smtClean="0"/>
-              <a:t>AddOutputFilterByType</a:t>
-            </a:r>
-            <a:r>
-              <a:rPr lang="en-US" dirty="0" smtClean="0"/>
-              <a:t> </a:t>
-            </a:r>
-            <a:r>
-              <a:rPr lang="en-US" dirty="0"/>
-              <a:t>DEFLATE text/html text/</a:t>
-            </a:r>
-            <a:r>
-              <a:rPr lang="en-US" dirty="0" err="1"/>
-              <a:t>css</a:t>
-            </a:r>
-            <a:r>
-              <a:rPr lang="en-US" dirty="0"/>
-              <a:t> text/</a:t>
-            </a:r>
-            <a:r>
-              <a:rPr lang="en-US" dirty="0" err="1"/>
-              <a:t>javascript</a:t>
-            </a:r>
-            <a:r>
-              <a:rPr lang="en-US" dirty="0"/>
-              <a:t> </a:t>
-            </a:r>
-          </a:p>
-          <a:p>
-            <a:pPr marL="0" indent="0">
-              <a:buNone/>
-            </a:pPr>
-            <a:r>
-              <a:rPr lang="en-US" dirty="0"/>
-              <a:t>&lt;/</a:t>
-            </a:r>
-            <a:r>
-              <a:rPr lang="en-US" dirty="0" err="1"/>
-              <a:t>IfModule</a:t>
-            </a:r>
-            <a:r>
-              <a:rPr lang="en-US" dirty="0"/>
-              <a:t>&gt;</a:t>
-            </a:r>
-          </a:p>
-          <a:p>
-            <a:r>
-              <a:rPr lang="en-US" dirty="0" smtClean="0"/>
-              <a:t>For IIS, use </a:t>
-            </a:r>
-            <a:r>
-              <a:rPr lang="en-US" dirty="0" err="1"/>
-              <a:t>inetmgr</a:t>
-            </a:r>
-            <a:r>
-              <a:rPr lang="en-US" dirty="0"/>
-              <a:t> </a:t>
-            </a:r>
-            <a:r>
-              <a:rPr lang="en-US" dirty="0" smtClean="0"/>
-              <a:t>GUI tool</a:t>
-            </a:r>
-          </a:p>
-          <a:p>
-            <a:endParaRPr lang="en-US" dirty="0"/>
-          </a:p>
-          <a:p>
-            <a:r>
-              <a:rPr lang="en-US" dirty="0" smtClean="0"/>
-              <a:t>Don’t enable compression on  images</a:t>
-            </a:r>
-            <a:endParaRPr lang="en-US" dirty="0"/>
           </a:p>
         </p:txBody>
       </p:sp>
     </p:spTree>
     <p:extLst>
       <p:ext uri="{BB962C8B-B14F-4D97-AF65-F5344CB8AC3E}">
-        <p14:creationId xmlns:p14="http://schemas.microsoft.com/office/powerpoint/2010/main" val="373885462"/>
+        <p14:creationId xmlns:p14="http://schemas.microsoft.com/office/powerpoint/2010/main" val="1869496055"/>
       </p:ext>
     </p:extLst>
   </p:cSld>
@@ -4703,7 +4849,7 @@
           <a:p>
             <a:r>
               <a:rPr lang="en-US" dirty="0" smtClean="0"/>
-              <a:t>Image Compression</a:t>
+              <a:t>Other Servers</a:t>
             </a:r>
             <a:endParaRPr lang="en-US" dirty="0"/>
           </a:p>
@@ -4725,8 +4871,120 @@
           <a:lstStyle/>
           <a:p>
             <a:r>
+              <a:rPr lang="en-US" dirty="0" smtClean="0"/>
+              <a:t>For Apache, edit </a:t>
+            </a:r>
+            <a:r>
               <a:rPr lang="en-US" dirty="0" err="1" smtClean="0"/>
-              <a:t>tinyPNG.com</a:t>
+              <a:t>httpd.conf</a:t>
+            </a:r>
+            <a:endParaRPr lang="en-US" dirty="0" smtClean="0"/>
+          </a:p>
+          <a:p>
+            <a:pPr marL="0" indent="0">
+              <a:buNone/>
+            </a:pPr>
+            <a:r>
+              <a:rPr lang="en-US" dirty="0" smtClean="0"/>
+              <a:t>&lt;</a:t>
+            </a:r>
+            <a:r>
+              <a:rPr lang="en-US" dirty="0" err="1"/>
+              <a:t>IfModule</a:t>
+            </a:r>
+            <a:r>
+              <a:rPr lang="en-US" dirty="0"/>
+              <a:t> </a:t>
+            </a:r>
+            <a:r>
+              <a:rPr lang="en-US" dirty="0" err="1"/>
+              <a:t>mod_deflate.c</a:t>
+            </a:r>
+            <a:r>
+              <a:rPr lang="en-US" dirty="0"/>
+              <a:t>&gt; </a:t>
+            </a:r>
+            <a:endParaRPr lang="en-US" dirty="0" smtClean="0"/>
+          </a:p>
+          <a:p>
+            <a:pPr marL="0" indent="0">
+              <a:buNone/>
+            </a:pPr>
+            <a:r>
+              <a:rPr lang="en-US" dirty="0" smtClean="0"/>
+              <a:t>    </a:t>
+            </a:r>
+            <a:r>
+              <a:rPr lang="en-US" dirty="0" err="1" smtClean="0"/>
+              <a:t>AddOutputFilterByType</a:t>
+            </a:r>
+            <a:r>
+              <a:rPr lang="en-US" dirty="0" smtClean="0"/>
+              <a:t> </a:t>
+            </a:r>
+            <a:r>
+              <a:rPr lang="en-US" dirty="0"/>
+              <a:t>DEFLATE text/html text/</a:t>
+            </a:r>
+            <a:r>
+              <a:rPr lang="en-US" dirty="0" err="1"/>
+              <a:t>css</a:t>
+            </a:r>
+            <a:r>
+              <a:rPr lang="en-US" dirty="0"/>
+              <a:t> text/</a:t>
+            </a:r>
+            <a:r>
+              <a:rPr lang="en-US" dirty="0" err="1"/>
+              <a:t>javascript</a:t>
+            </a:r>
+            <a:r>
+              <a:rPr lang="en-US" dirty="0"/>
+              <a:t> </a:t>
+            </a:r>
+          </a:p>
+          <a:p>
+            <a:pPr marL="0" indent="0">
+              <a:buNone/>
+            </a:pPr>
+            <a:r>
+              <a:rPr lang="en-US" dirty="0"/>
+              <a:t>&lt;/</a:t>
+            </a:r>
+            <a:r>
+              <a:rPr lang="en-US" dirty="0" err="1"/>
+              <a:t>IfModule</a:t>
+            </a:r>
+            <a:r>
+              <a:rPr lang="en-US" dirty="0"/>
+              <a:t>&gt;</a:t>
+            </a:r>
+          </a:p>
+          <a:p>
+            <a:r>
+              <a:rPr lang="en-US" dirty="0" smtClean="0"/>
+              <a:t>For IIS, use </a:t>
+            </a:r>
+            <a:r>
+              <a:rPr lang="en-US" dirty="0" err="1"/>
+              <a:t>inetmgr</a:t>
+            </a:r>
+            <a:r>
+              <a:rPr lang="en-US" dirty="0"/>
+              <a:t> </a:t>
+            </a:r>
+            <a:r>
+              <a:rPr lang="en-US" dirty="0" smtClean="0"/>
+              <a:t>GUI tool</a:t>
+            </a:r>
+          </a:p>
+          <a:p>
+            <a:endParaRPr lang="en-US" dirty="0"/>
+          </a:p>
+          <a:p>
+            <a:r>
+              <a:rPr lang="en-US" dirty="0" smtClean="0"/>
+              <a:t>Don’t enable compression on  images</a:t>
             </a:r>
             <a:endParaRPr lang="en-US" dirty="0"/>
           </a:p>
@@ -4735,7 +4993,7 @@
     </p:spTree>
     <p:extLst>
       <p:ext uri="{BB962C8B-B14F-4D97-AF65-F5344CB8AC3E}">
-        <p14:creationId xmlns:p14="http://schemas.microsoft.com/office/powerpoint/2010/main" val="1646641523"/>
+        <p14:creationId xmlns:p14="http://schemas.microsoft.com/office/powerpoint/2010/main" val="373885462"/>
       </p:ext>
     </p:extLst>
   </p:cSld>
@@ -4769,160 +5027,40 @@
             <a:spLocks noGrp="1"/>
           </p:cNvSpPr>
           <p:nvPr>
-            <p:ph type="ctrTitle"/>
-          </p:nvPr>
-        </p:nvSpPr>
-        <p:spPr>
-          <a:xfrm>
-            <a:off x="1524000" y="1122363"/>
-            <a:ext cx="9144000" cy="1069044"/>
-          </a:xfrm>
-        </p:spPr>
+            <p:ph type="title"/>
+          </p:nvPr>
+        </p:nvSpPr>
+        <p:spPr/>
+        <p:txBody>
+          <a:bodyPr/>
+          <a:lstStyle/>
+          <a:p>
+            <a:r>
+              <a:rPr lang="en-US" dirty="0" smtClean="0"/>
+              <a:t>Image Compression</a:t>
+            </a:r>
+            <a:endParaRPr lang="en-US" dirty="0"/>
+          </a:p>
+        </p:txBody>
+      </p:sp>
+      <p:sp>
+        <p:nvSpPr>
+          <p:cNvPr id="3" name="Content Placeholder 2"/>
+          <p:cNvSpPr>
+            <a:spLocks noGrp="1"/>
+          </p:cNvSpPr>
+          <p:nvPr>
+            <p:ph idx="1"/>
+          </p:nvPr>
+        </p:nvSpPr>
+        <p:spPr/>
         <p:txBody>
           <a:bodyPr/>
           <a:lstStyle/>
           <a:p>
             <a:r>
               <a:rPr lang="en-US" dirty="0" err="1" smtClean="0"/>
-              <a:t>Ch</a:t>
-            </a:r>
-            <a:r>
-              <a:rPr lang="en-US" dirty="0" smtClean="0"/>
-              <a:t> 2: </a:t>
-            </a:r>
-            <a:r>
-              <a:rPr lang="en-US" dirty="0" err="1" smtClean="0"/>
-              <a:t>Assesment</a:t>
-            </a:r>
-            <a:r>
-              <a:rPr lang="en-US" dirty="0" smtClean="0"/>
-              <a:t> Tools</a:t>
-            </a:r>
-            <a:endParaRPr lang="en-US" dirty="0"/>
-          </a:p>
-        </p:txBody>
-      </p:sp>
-      <p:sp>
-        <p:nvSpPr>
-          <p:cNvPr id="3" name="Subtitle 2"/>
-          <p:cNvSpPr>
-            <a:spLocks noGrp="1"/>
-          </p:cNvSpPr>
-          <p:nvPr>
-            <p:ph type="subTitle" idx="1"/>
-          </p:nvPr>
-        </p:nvSpPr>
-        <p:spPr>
-          <a:xfrm>
-            <a:off x="1524000" y="2301765"/>
-            <a:ext cx="9144000" cy="3673365"/>
-          </a:xfrm>
-        </p:spPr>
-        <p:txBody>
-          <a:bodyPr>
-            <a:normAutofit/>
-          </a:bodyPr>
-          <a:lstStyle/>
-          <a:p>
-            <a:r>
-              <a:rPr lang="en-US" dirty="0" smtClean="0">
-                <a:hlinkClick r:id="rId2"/>
-              </a:rPr>
-              <a:t>git@github.com:GTC-JS/ExtraPresentations.git</a:t>
-            </a:r>
-            <a:endParaRPr lang="en-US" dirty="0" smtClean="0"/>
-          </a:p>
-          <a:p>
-            <a:endParaRPr lang="en-US" dirty="0" smtClean="0"/>
-          </a:p>
-          <a:p>
-            <a:pPr lvl="0" fontAlgn="base"/>
-            <a:r>
-              <a:rPr lang="en-US" dirty="0" smtClean="0"/>
-              <a:t>- Google </a:t>
-            </a:r>
-            <a:r>
-              <a:rPr lang="en-US" dirty="0" err="1"/>
-              <a:t>PageSpeed</a:t>
-            </a:r>
-            <a:r>
-              <a:rPr lang="en-US" dirty="0"/>
-              <a:t> </a:t>
-            </a:r>
-            <a:r>
-              <a:rPr lang="en-US" dirty="0" smtClean="0"/>
-              <a:t>Insights</a:t>
-            </a:r>
-            <a:endParaRPr lang="en-US" dirty="0"/>
-          </a:p>
-          <a:p>
-            <a:pPr lvl="0" fontAlgn="base"/>
-            <a:r>
-              <a:rPr lang="en-US" dirty="0" smtClean="0"/>
-              <a:t>- Network </a:t>
-            </a:r>
-            <a:r>
-              <a:rPr lang="en-US" dirty="0"/>
-              <a:t>request inspectors </a:t>
-            </a:r>
-            <a:r>
-              <a:rPr lang="en-US" dirty="0" smtClean="0"/>
-              <a:t>for timing </a:t>
-            </a:r>
-            <a:r>
-              <a:rPr lang="en-US" dirty="0"/>
-              <a:t>information for </a:t>
-            </a:r>
-            <a:r>
-              <a:rPr lang="en-US" dirty="0" smtClean="0"/>
-              <a:t>assets</a:t>
-            </a:r>
-            <a:endParaRPr lang="en-US" dirty="0"/>
-          </a:p>
-          <a:p>
-            <a:pPr lvl="0" fontAlgn="base"/>
-            <a:r>
-              <a:rPr lang="en-US" dirty="0" smtClean="0"/>
-              <a:t>- Rendering </a:t>
-            </a:r>
-            <a:r>
-              <a:rPr lang="en-US" dirty="0"/>
-              <a:t>profilers to diagnose poor rendering </a:t>
-            </a:r>
-            <a:r>
-              <a:rPr lang="en-US" dirty="0" smtClean="0"/>
-              <a:t>performance</a:t>
-            </a:r>
-            <a:endParaRPr lang="en-US" dirty="0"/>
-          </a:p>
-          <a:p>
-            <a:pPr lvl="0" fontAlgn="base"/>
-            <a:r>
-              <a:rPr lang="en-US" dirty="0" smtClean="0"/>
-              <a:t>- Benchmarking </a:t>
-            </a:r>
-            <a:r>
-              <a:rPr lang="en-US" dirty="0"/>
-              <a:t>JavaScript </a:t>
-            </a:r>
-            <a:r>
-              <a:rPr lang="en-US" dirty="0" smtClean="0"/>
-              <a:t>code</a:t>
-            </a:r>
-            <a:endParaRPr lang="en-US" dirty="0"/>
-          </a:p>
-          <a:p>
-            <a:r>
-              <a:rPr lang="en-US" dirty="0" smtClean="0"/>
-              <a:t>- Emulating different device </a:t>
-            </a:r>
-            <a:r>
-              <a:rPr lang="en-US" dirty="0"/>
-              <a:t>and internet </a:t>
-            </a:r>
-            <a:r>
-              <a:rPr lang="en-US" dirty="0" smtClean="0"/>
-              <a:t>connection </a:t>
+              <a:t>tinyPNG.com</a:t>
             </a:r>
             <a:endParaRPr lang="en-US" dirty="0"/>
           </a:p>
@@ -4931,7 +5069,7 @@
     </p:spTree>
     <p:extLst>
       <p:ext uri="{BB962C8B-B14F-4D97-AF65-F5344CB8AC3E}">
-        <p14:creationId xmlns:p14="http://schemas.microsoft.com/office/powerpoint/2010/main" val="430172066"/>
+        <p14:creationId xmlns:p14="http://schemas.microsoft.com/office/powerpoint/2010/main" val="1646641523"/>
       </p:ext>
     </p:extLst>
   </p:cSld>
@@ -4965,6 +5103,202 @@
             <a:spLocks noGrp="1"/>
           </p:cNvSpPr>
           <p:nvPr>
+            <p:ph type="ctrTitle"/>
+          </p:nvPr>
+        </p:nvSpPr>
+        <p:spPr>
+          <a:xfrm>
+            <a:off x="1524000" y="1122363"/>
+            <a:ext cx="9144000" cy="1069044"/>
+          </a:xfrm>
+        </p:spPr>
+        <p:txBody>
+          <a:bodyPr/>
+          <a:lstStyle/>
+          <a:p>
+            <a:r>
+              <a:rPr lang="en-US" dirty="0" err="1" smtClean="0"/>
+              <a:t>Ch</a:t>
+            </a:r>
+            <a:r>
+              <a:rPr lang="en-US" dirty="0" smtClean="0"/>
+              <a:t> 2: </a:t>
+            </a:r>
+            <a:r>
+              <a:rPr lang="en-US" dirty="0" err="1" smtClean="0"/>
+              <a:t>Assesment</a:t>
+            </a:r>
+            <a:r>
+              <a:rPr lang="en-US" dirty="0" smtClean="0"/>
+              <a:t> Tools</a:t>
+            </a:r>
+            <a:endParaRPr lang="en-US" dirty="0"/>
+          </a:p>
+        </p:txBody>
+      </p:sp>
+      <p:sp>
+        <p:nvSpPr>
+          <p:cNvPr id="3" name="Subtitle 2"/>
+          <p:cNvSpPr>
+            <a:spLocks noGrp="1"/>
+          </p:cNvSpPr>
+          <p:nvPr>
+            <p:ph type="subTitle" idx="1"/>
+          </p:nvPr>
+        </p:nvSpPr>
+        <p:spPr>
+          <a:xfrm>
+            <a:off x="1524000" y="2301765"/>
+            <a:ext cx="9144000" cy="3673365"/>
+          </a:xfrm>
+        </p:spPr>
+        <p:txBody>
+          <a:bodyPr>
+            <a:normAutofit/>
+          </a:bodyPr>
+          <a:lstStyle/>
+          <a:p>
+            <a:r>
+              <a:rPr lang="en-US" dirty="0" smtClean="0">
+                <a:hlinkClick r:id="rId2"/>
+              </a:rPr>
+              <a:t>git@github.com:GTC-JS/ExtraPresentations.git</a:t>
+            </a:r>
+            <a:endParaRPr lang="en-US" dirty="0" smtClean="0"/>
+          </a:p>
+          <a:p>
+            <a:endParaRPr lang="en-US" dirty="0" smtClean="0"/>
+          </a:p>
+          <a:p>
+            <a:pPr lvl="0" fontAlgn="base"/>
+            <a:r>
+              <a:rPr lang="en-US" dirty="0" smtClean="0"/>
+              <a:t>- Google </a:t>
+            </a:r>
+            <a:r>
+              <a:rPr lang="en-US" dirty="0" err="1"/>
+              <a:t>PageSpeed</a:t>
+            </a:r>
+            <a:r>
+              <a:rPr lang="en-US" dirty="0"/>
+              <a:t> </a:t>
+            </a:r>
+            <a:r>
+              <a:rPr lang="en-US" dirty="0" smtClean="0"/>
+              <a:t>Insights</a:t>
+            </a:r>
+            <a:endParaRPr lang="en-US" dirty="0"/>
+          </a:p>
+          <a:p>
+            <a:pPr lvl="0" fontAlgn="base"/>
+            <a:r>
+              <a:rPr lang="en-US" dirty="0" smtClean="0"/>
+              <a:t>- Network </a:t>
+            </a:r>
+            <a:r>
+              <a:rPr lang="en-US" dirty="0"/>
+              <a:t>request inspectors </a:t>
+            </a:r>
+            <a:r>
+              <a:rPr lang="en-US" dirty="0" smtClean="0"/>
+              <a:t>for timing </a:t>
+            </a:r>
+            <a:r>
+              <a:rPr lang="en-US" dirty="0"/>
+              <a:t>information for </a:t>
+            </a:r>
+            <a:r>
+              <a:rPr lang="en-US" dirty="0" smtClean="0"/>
+              <a:t>assets</a:t>
+            </a:r>
+            <a:endParaRPr lang="en-US" dirty="0"/>
+          </a:p>
+          <a:p>
+            <a:pPr lvl="0" fontAlgn="base"/>
+            <a:r>
+              <a:rPr lang="en-US" dirty="0" smtClean="0"/>
+              <a:t>- Rendering </a:t>
+            </a:r>
+            <a:r>
+              <a:rPr lang="en-US" dirty="0"/>
+              <a:t>profilers to diagnose poor rendering </a:t>
+            </a:r>
+            <a:r>
+              <a:rPr lang="en-US" dirty="0" smtClean="0"/>
+              <a:t>performance</a:t>
+            </a:r>
+            <a:endParaRPr lang="en-US" dirty="0"/>
+          </a:p>
+          <a:p>
+            <a:pPr lvl="0" fontAlgn="base"/>
+            <a:r>
+              <a:rPr lang="en-US" dirty="0" smtClean="0"/>
+              <a:t>- Benchmarking </a:t>
+            </a:r>
+            <a:r>
+              <a:rPr lang="en-US" dirty="0"/>
+              <a:t>JavaScript </a:t>
+            </a:r>
+            <a:r>
+              <a:rPr lang="en-US" dirty="0" smtClean="0"/>
+              <a:t>code</a:t>
+            </a:r>
+            <a:endParaRPr lang="en-US" dirty="0"/>
+          </a:p>
+          <a:p>
+            <a:r>
+              <a:rPr lang="en-US" dirty="0" smtClean="0"/>
+              <a:t>- Emulating different device </a:t>
+            </a:r>
+            <a:r>
+              <a:rPr lang="en-US" dirty="0"/>
+              <a:t>and internet </a:t>
+            </a:r>
+            <a:r>
+              <a:rPr lang="en-US" dirty="0" smtClean="0"/>
+              <a:t>connection </a:t>
+            </a:r>
+            <a:endParaRPr lang="en-US" dirty="0"/>
+          </a:p>
+        </p:txBody>
+      </p:sp>
+    </p:spTree>
+    <p:extLst>
+      <p:ext uri="{BB962C8B-B14F-4D97-AF65-F5344CB8AC3E}">
+        <p14:creationId xmlns:p14="http://schemas.microsoft.com/office/powerpoint/2010/main" val="430172066"/>
+      </p:ext>
+    </p:extLst>
+  </p:cSld>
+  <p:clrMapOvr>
+    <a:masterClrMapping/>
+  </p:clrMapOvr>
+</p:sld>
+</file>
+
+<file path=ppt/slides/slide17.xml><?xml version="1.0" encoding="utf-8"?>
+<p:sld xmlns:a="http://schemas.openxmlformats.org/drawingml/2006/main" xmlns:r="http://schemas.openxmlformats.org/officeDocument/2006/relationships" xmlns:p="http://schemas.openxmlformats.org/presentationml/2006/main">
+  <p:cSld>
+    <p:spTree>
+      <p:nvGrpSpPr>
+        <p:cNvPr id="1" name=""/>
+        <p:cNvGrpSpPr/>
+        <p:nvPr/>
+      </p:nvGrpSpPr>
+      <p:grpSpPr>
+        <a:xfrm>
+          <a:off x="0" y="0"/>
+          <a:ext cx="0" cy="0"/>
+          <a:chOff x="0" y="0"/>
+          <a:chExt cx="0" cy="0"/>
+        </a:xfrm>
+      </p:grpSpPr>
+      <p:sp>
+        <p:nvSpPr>
+          <p:cNvPr id="2" name="Title 1"/>
+          <p:cNvSpPr>
+            <a:spLocks noGrp="1"/>
+          </p:cNvSpPr>
+          <p:nvPr>
             <p:ph type="title"/>
           </p:nvPr>
         </p:nvSpPr>
@@ -5010,15 +5344,18 @@
           <a:lstStyle/>
           <a:p>
             <a:r>
+              <a:rPr lang="en-US" dirty="0">
+                <a:hlinkClick r:id="rId2"/>
+              </a:rPr>
+              <a:t>https://developers.google.com/speed/pagespeed/insights</a:t>
+            </a:r>
+            <a:r>
               <a:rPr lang="en-US" dirty="0" smtClean="0">
                 <a:hlinkClick r:id="rId2"/>
               </a:rPr>
-              <a:t>https://developers.google.com/speed/</a:t>
+              <a:t>/</a:t>
             </a:r>
             <a:endParaRPr lang="en-US" dirty="0" smtClean="0"/>
-          </a:p>
-          <a:p>
-            <a:endParaRPr lang="en-US" dirty="0"/>
           </a:p>
         </p:txBody>
       </p:sp>
@@ -5065,7 +5402,7 @@
 </p:sld>
 </file>
 
-<file path=ppt/slides/slide17.xml><?xml version="1.0" encoding="utf-8"?>
+<file path=ppt/slides/slide18.xml><?xml version="1.0" encoding="utf-8"?>
 <p:sld xmlns:a="http://schemas.openxmlformats.org/drawingml/2006/main" xmlns:r="http://schemas.openxmlformats.org/officeDocument/2006/relationships" xmlns:p="http://schemas.openxmlformats.org/presentationml/2006/main">
   <p:cSld>
     <p:spTree>
@@ -5219,7 +5556,7 @@
 </p:sld>
 </file>
 
-<file path=ppt/slides/slide18.xml><?xml version="1.0" encoding="utf-8"?>
+<file path=ppt/slides/slide19.xml><?xml version="1.0" encoding="utf-8"?>
 <p:sld xmlns:a="http://schemas.openxmlformats.org/drawingml/2006/main" xmlns:r="http://schemas.openxmlformats.org/officeDocument/2006/relationships" xmlns:p="http://schemas.openxmlformats.org/presentationml/2006/main">
   <p:cSld>
     <p:spTree>
@@ -5335,89 +5672,6 @@
     <p:extLst>
       <p:ext uri="{BB962C8B-B14F-4D97-AF65-F5344CB8AC3E}">
         <p14:creationId xmlns:p14="http://schemas.microsoft.com/office/powerpoint/2010/main" val="1527702046"/>
-      </p:ext>
-    </p:extLst>
-  </p:cSld>
-  <p:clrMapOvr>
-    <a:masterClrMapping/>
-  </p:clrMapOvr>
-</p:sld>
-</file>
-
-<file path=ppt/slides/slide19.xml><?xml version="1.0" encoding="utf-8"?>
-<p:sld xmlns:a="http://schemas.openxmlformats.org/drawingml/2006/main" xmlns:r="http://schemas.openxmlformats.org/officeDocument/2006/relationships" xmlns:p="http://schemas.openxmlformats.org/presentationml/2006/main">
-  <p:cSld>
-    <p:spTree>
-      <p:nvGrpSpPr>
-        <p:cNvPr id="1" name=""/>
-        <p:cNvGrpSpPr/>
-        <p:nvPr/>
-      </p:nvGrpSpPr>
-      <p:grpSpPr>
-        <a:xfrm>
-          <a:off x="0" y="0"/>
-          <a:ext cx="0" cy="0"/>
-          <a:chOff x="0" y="0"/>
-          <a:chExt cx="0" cy="0"/>
-        </a:xfrm>
-      </p:grpSpPr>
-      <p:sp>
-        <p:nvSpPr>
-          <p:cNvPr id="2" name="Title 1"/>
-          <p:cNvSpPr>
-            <a:spLocks noGrp="1"/>
-          </p:cNvSpPr>
-          <p:nvPr>
-            <p:ph type="title"/>
-          </p:nvPr>
-        </p:nvSpPr>
-        <p:spPr/>
-        <p:txBody>
-          <a:bodyPr/>
-          <a:lstStyle/>
-          <a:p>
-            <a:r>
-              <a:rPr lang="en-US" dirty="0" smtClean="0"/>
-              <a:t>Headers</a:t>
-            </a:r>
-            <a:endParaRPr lang="en-US" dirty="0"/>
-          </a:p>
-        </p:txBody>
-      </p:sp>
-      <p:pic>
-        <p:nvPicPr>
-          <p:cNvPr id="4" name="Picture 3"/>
-          <p:cNvPicPr>
-            <a:picLocks noChangeAspect="1"/>
-          </p:cNvPicPr>
-          <p:nvPr/>
-        </p:nvPicPr>
-        <p:blipFill>
-          <a:blip r:embed="rId2">
-            <a:extLst>
-              <a:ext uri="{28A0092B-C50C-407E-A947-70E740481C1C}">
-                <a14:useLocalDpi xmlns:a14="http://schemas.microsoft.com/office/drawing/2010/main" val="0"/>
-              </a:ext>
-            </a:extLst>
-          </a:blip>
-          <a:stretch>
-            <a:fillRect/>
-          </a:stretch>
-        </p:blipFill>
-        <p:spPr>
-          <a:xfrm>
-            <a:off x="1210737" y="2222499"/>
-            <a:ext cx="9186332" cy="4548281"/>
-          </a:xfrm>
-          <a:prstGeom prst="rect">
-            <a:avLst/>
-          </a:prstGeom>
-        </p:spPr>
-      </p:pic>
-    </p:spTree>
-    <p:extLst>
-      <p:ext uri="{BB962C8B-B14F-4D97-AF65-F5344CB8AC3E}">
-        <p14:creationId xmlns:p14="http://schemas.microsoft.com/office/powerpoint/2010/main" val="1504462125"/>
       </p:ext>
     </p:extLst>
   </p:cSld>
@@ -5590,6 +5844,89 @@
           <a:p>
             <a:r>
               <a:rPr lang="en-US" dirty="0" smtClean="0"/>
+              <a:t>Headers</a:t>
+            </a:r>
+            <a:endParaRPr lang="en-US" dirty="0"/>
+          </a:p>
+        </p:txBody>
+      </p:sp>
+      <p:pic>
+        <p:nvPicPr>
+          <p:cNvPr id="4" name="Picture 3"/>
+          <p:cNvPicPr>
+            <a:picLocks noChangeAspect="1"/>
+          </p:cNvPicPr>
+          <p:nvPr/>
+        </p:nvPicPr>
+        <p:blipFill>
+          <a:blip r:embed="rId2">
+            <a:extLst>
+              <a:ext uri="{28A0092B-C50C-407E-A947-70E740481C1C}">
+                <a14:useLocalDpi xmlns:a14="http://schemas.microsoft.com/office/drawing/2010/main" val="0"/>
+              </a:ext>
+            </a:extLst>
+          </a:blip>
+          <a:stretch>
+            <a:fillRect/>
+          </a:stretch>
+        </p:blipFill>
+        <p:spPr>
+          <a:xfrm>
+            <a:off x="1210737" y="2222499"/>
+            <a:ext cx="9186332" cy="4548281"/>
+          </a:xfrm>
+          <a:prstGeom prst="rect">
+            <a:avLst/>
+          </a:prstGeom>
+        </p:spPr>
+      </p:pic>
+    </p:spTree>
+    <p:extLst>
+      <p:ext uri="{BB962C8B-B14F-4D97-AF65-F5344CB8AC3E}">
+        <p14:creationId xmlns:p14="http://schemas.microsoft.com/office/powerpoint/2010/main" val="1504462125"/>
+      </p:ext>
+    </p:extLst>
+  </p:cSld>
+  <p:clrMapOvr>
+    <a:masterClrMapping/>
+  </p:clrMapOvr>
+</p:sld>
+</file>
+
+<file path=ppt/slides/slide21.xml><?xml version="1.0" encoding="utf-8"?>
+<p:sld xmlns:a="http://schemas.openxmlformats.org/drawingml/2006/main" xmlns:r="http://schemas.openxmlformats.org/officeDocument/2006/relationships" xmlns:p="http://schemas.openxmlformats.org/presentationml/2006/main">
+  <p:cSld>
+    <p:spTree>
+      <p:nvGrpSpPr>
+        <p:cNvPr id="1" name=""/>
+        <p:cNvGrpSpPr/>
+        <p:nvPr/>
+      </p:nvGrpSpPr>
+      <p:grpSpPr>
+        <a:xfrm>
+          <a:off x="0" y="0"/>
+          <a:ext cx="0" cy="0"/>
+          <a:chOff x="0" y="0"/>
+          <a:chExt cx="0" cy="0"/>
+        </a:xfrm>
+      </p:grpSpPr>
+      <p:sp>
+        <p:nvSpPr>
+          <p:cNvPr id="2" name="Title 1"/>
+          <p:cNvSpPr>
+            <a:spLocks noGrp="1"/>
+          </p:cNvSpPr>
+          <p:nvPr>
+            <p:ph type="title"/>
+          </p:nvPr>
+        </p:nvSpPr>
+        <p:spPr/>
+        <p:txBody>
+          <a:bodyPr/>
+          <a:lstStyle/>
+          <a:p>
+            <a:r>
+              <a:rPr lang="en-US" dirty="0" smtClean="0"/>
               <a:t>Viewing Headers</a:t>
             </a:r>
             <a:endParaRPr lang="en-US" dirty="0"/>
@@ -6283,7 +6620,9 @@
         </p:nvSpPr>
         <p:spPr/>
         <p:txBody>
-          <a:bodyPr/>
+          <a:bodyPr>
+            <a:normAutofit lnSpcReduction="10000"/>
+          </a:bodyPr>
           <a:lstStyle/>
           <a:p>
             <a:r>
@@ -6407,33 +6746,47 @@
               <a:rPr lang="en-US" dirty="0" smtClean="0"/>
               <a:t>/ch1-coyle.git</a:t>
             </a:r>
+            <a:endParaRPr lang="en-US" dirty="0" smtClean="0"/>
+          </a:p>
+          <a:p>
+            <a:pPr lvl="1"/>
+            <a:r>
+              <a:rPr lang="en-US" dirty="0" smtClean="0"/>
+              <a:t>&gt; cd </a:t>
+            </a:r>
+            <a:r>
+              <a:rPr lang="en-US" dirty="0" smtClean="0"/>
+              <a:t>ch1-coyle</a:t>
+            </a:r>
           </a:p>
           <a:p>
             <a:pPr lvl="2"/>
             <a:r>
               <a:rPr lang="en-US" dirty="0" smtClean="0"/>
+              <a:t>End result: </a:t>
+            </a:r>
+            <a:r>
+              <a:rPr lang="en-US" dirty="0" err="1" smtClean="0"/>
+              <a:t>git</a:t>
+            </a:r>
+            <a:r>
+              <a:rPr lang="en-US" dirty="0" smtClean="0"/>
+              <a:t> </a:t>
+            </a:r>
+            <a:r>
+              <a:rPr lang="en-US" dirty="0"/>
+              <a:t>checkout -f optimized</a:t>
+            </a:r>
+            <a:endParaRPr lang="en-US" dirty="0" smtClean="0"/>
+          </a:p>
+          <a:p>
+            <a:r>
+              <a:rPr lang="en-US" dirty="0" smtClean="0"/>
               <a:t>&gt; </a:t>
             </a:r>
             <a:r>
-              <a:rPr lang="en-US" dirty="0" err="1" smtClean="0"/>
-              <a:t>git@github.com:GTC-JS</a:t>
-            </a:r>
-            <a:r>
-              <a:rPr lang="en-US" dirty="0" smtClean="0"/>
-              <a:t>/ch1-coyle.git</a:t>
-            </a:r>
-          </a:p>
-          <a:p>
-            <a:pPr lvl="1"/>
-            <a:r>
-              <a:rPr lang="en-US" dirty="0" smtClean="0"/>
-              <a:t>&gt; cd ch1-coyle</a:t>
-            </a:r>
-          </a:p>
-          <a:p>
-            <a:r>
-              <a:rPr lang="en-US" dirty="0" smtClean="0"/>
-              <a:t>&gt; node </a:t>
+              <a:rPr lang="en-US" dirty="0" smtClean="0"/>
+              <a:t>node </a:t>
             </a:r>
             <a:r>
               <a:rPr lang="en-US" dirty="0" err="1"/>
@@ -6442,6 +6795,10 @@
             <a:endParaRPr lang="en-US" dirty="0"/>
           </a:p>
           <a:p>
+            <a:r>
+              <a:rPr lang="en-US" dirty="0"/>
+              <a:t>Visit http://localhost:8080/</a:t>
+            </a:r>
             <a:endParaRPr lang="en-US" dirty="0"/>
           </a:p>
         </p:txBody>
@@ -6691,7 +7048,7 @@
         </p:blipFill>
         <p:spPr>
           <a:xfrm>
-            <a:off x="1608084" y="2561000"/>
+            <a:off x="1608084" y="2214154"/>
             <a:ext cx="8343626" cy="3889706"/>
           </a:xfrm>
           <a:prstGeom prst="rect">

</xml_diff>